<commit_message>
PAI 04 über arbeitet
</commit_message>
<xml_diff>
--- a/training-cards/agile moves/Pairing (PAI)/ger_PAI_04_An_einem_Strang_ziehen_AM_A.pptx
+++ b/training-cards/agile moves/Pairing (PAI)/ger_PAI_04_An_einem_Strang_ziehen_AM_A.pptx
@@ -107,7 +107,7 @@
   </p:defaultTextStyle>
   <p:extLst>
     <p:ext uri="{EFAFB233-063F-42B5-8137-9DF3F51BA10A}">
-      <p15:sldGuideLst xmlns:p15="http://schemas.microsoft.com/office/powerpoint/2012/main" xmlns="">
+      <p15:sldGuideLst xmlns="" xmlns:p15="http://schemas.microsoft.com/office/powerpoint/2012/main">
         <p15:guide id="1" orient="horz" pos="1103">
           <p15:clr>
             <a:srgbClr val="A4A3A4"/>
@@ -781,7 +781,7 @@
           <a:p>
             <a:fld id="{FF5B2BAF-DF38-0A48-A798-0C06E514FD52}" type="datetimeFigureOut">
               <a:rPr lang="de-DE" smtClean="0"/>
-              <a:t>14.12.15</a:t>
+              <a:t>21.12.15</a:t>
             </a:fld>
             <a:endParaRPr lang="de-DE" dirty="0"/>
           </a:p>
@@ -1004,7 +1004,7 @@
           <a:p>
             <a:fld id="{FF5B2BAF-DF38-0A48-A798-0C06E514FD52}" type="datetimeFigureOut">
               <a:rPr lang="de-DE" smtClean="0"/>
-              <a:t>14.12.15</a:t>
+              <a:t>21.12.15</a:t>
             </a:fld>
             <a:endParaRPr lang="de-DE" dirty="0"/>
           </a:p>
@@ -1592,7 +1592,7 @@
         </p:nvSpPr>
         <p:spPr>
           <a:xfrm>
-            <a:off x="1166812" y="885929"/>
+            <a:off x="1166812" y="829739"/>
             <a:ext cx="5902728" cy="461665"/>
           </a:xfrm>
         </p:spPr>
@@ -1850,6 +1850,86 @@
           </a:p>
         </p:txBody>
       </p:sp>
+      <p:sp>
+        <p:nvSpPr>
+          <p:cNvPr id="8" name="Titelplatzhalter 1"/>
+          <p:cNvSpPr txBox="1">
+            <a:spLocks/>
+          </p:cNvSpPr>
+          <p:nvPr/>
+        </p:nvSpPr>
+        <p:spPr>
+          <a:xfrm>
+            <a:off x="1177883" y="1238019"/>
+            <a:ext cx="3520053" cy="246221"/>
+          </a:xfrm>
+          <a:prstGeom prst="rect">
+            <a:avLst/>
+          </a:prstGeom>
+          <a:noFill/>
+        </p:spPr>
+        <p:txBody>
+          <a:bodyPr wrap="square" rtlCol="0">
+            <a:spAutoFit/>
+          </a:bodyPr>
+          <a:lstStyle>
+            <a:lvl1pPr algn="ctr" defTabSz="403388" rtl="0" eaLnBrk="1" latinLnBrk="0" hangingPunct="1">
+              <a:spcBef>
+                <a:spcPct val="0"/>
+              </a:spcBef>
+              <a:buNone/>
+              <a:defRPr lang="de-DE" sz="2400" b="0" kern="1200" baseline="0">
+                <a:solidFill>
+                  <a:srgbClr val="7E006B"/>
+                </a:solidFill>
+                <a:latin typeface="Avenir Heavy"/>
+                <a:ea typeface="+mn-ea"/>
+                <a:cs typeface="Avenir Heavy"/>
+              </a:defRPr>
+            </a:lvl1pPr>
+          </a:lstStyle>
+          <a:p>
+            <a:pPr algn="l"/>
+            <a:r>
+              <a:rPr lang="de-DE" sz="1000" dirty="0" smtClean="0">
+                <a:solidFill>
+                  <a:srgbClr val="5D5E5F"/>
+                </a:solidFill>
+                <a:latin typeface="Avenir Book"/>
+                <a:cs typeface="Avenir Book"/>
+              </a:rPr>
+              <a:t>MILENKO BUGUENO, REGINA</a:t>
+            </a:r>
+            <a:r>
+              <a:rPr lang="de-DE" sz="1000" baseline="0" dirty="0" smtClean="0">
+                <a:solidFill>
+                  <a:srgbClr val="5D5E5F"/>
+                </a:solidFill>
+                <a:latin typeface="Avenir Book"/>
+                <a:cs typeface="Avenir Book"/>
+              </a:rPr>
+              <a:t> </a:t>
+            </a:r>
+            <a:r>
+              <a:rPr lang="de-DE" sz="1000" baseline="0" dirty="0" smtClean="0">
+                <a:solidFill>
+                  <a:srgbClr val="5D5E5F"/>
+                </a:solidFill>
+                <a:latin typeface="Avenir Book"/>
+                <a:cs typeface="Avenir Book"/>
+              </a:rPr>
+              <a:t>BRANDHUBER</a:t>
+            </a:r>
+            <a:endParaRPr lang="de-DE" sz="1000" dirty="0">
+              <a:solidFill>
+                <a:srgbClr val="5D5E5F"/>
+              </a:solidFill>
+              <a:latin typeface="Avenir Book"/>
+              <a:cs typeface="Avenir Book"/>
+            </a:endParaRPr>
+          </a:p>
+        </p:txBody>
+      </p:sp>
     </p:spTree>
     <p:extLst>
       <p:ext uri="{BB962C8B-B14F-4D97-AF65-F5344CB8AC3E}">
@@ -1965,8 +2045,13 @@
           <a:p>
             <a:r>
               <a:rPr lang="de-DE" dirty="0" smtClean="0"/>
-              <a:t>Dokumentiere in der Rolle des Navigators die Ziele und die Erkenntnisse eurer Session!</a:t>
-            </a:r>
+              <a:t>Dokumentiere in der Rolle des Navigators die Ziele und die Erkenntnisse eurer Session</a:t>
+            </a:r>
+            <a:r>
+              <a:rPr lang="de-DE" dirty="0" smtClean="0"/>
+              <a:t>!</a:t>
+            </a:r>
+            <a:endParaRPr lang="de-DE" dirty="0" smtClean="0"/>
           </a:p>
           <a:p>
             <a:endParaRPr lang="de-DE" dirty="0"/>
@@ -1974,30 +2059,7 @@
           <a:p>
             <a:r>
               <a:rPr lang="de-DE" dirty="0" smtClean="0"/>
-              <a:t>Setze dich mit Deinem Team zusammen und besprecht, nach welchen Kriterien ihr die Pairing Sessions Sternebewerten möchtet!</a:t>
-            </a:r>
-          </a:p>
-          <a:p>
-            <a:endParaRPr lang="de-DE" dirty="0"/>
-          </a:p>
-          <a:p>
-            <a:r>
-              <a:rPr lang="de-DE" dirty="0" smtClean="0"/>
-              <a:t>Jede der 4 Pairing Sessions muss vom gesamten Team (eingeschlossen</a:t>
-            </a:r>
-            <a:br>
-              <a:rPr lang="de-DE" dirty="0" smtClean="0"/>
-            </a:br>
-            <a:r>
-              <a:rPr lang="de-DE" dirty="0" smtClean="0"/>
-              <a:t> beider Pairing Partner) mindestens eine durchschnittliche Sterne Bewertung</a:t>
-            </a:r>
-            <a:br>
-              <a:rPr lang="de-DE" dirty="0" smtClean="0"/>
-            </a:br>
-            <a:r>
-              <a:rPr lang="de-DE" dirty="0" smtClean="0"/>
-              <a:t> von 3,0 bekommen, um </a:t>
+              <a:t>Jede der 4 Pairing Sessions muss vom gesamten Team </a:t>
             </a:r>
             <a:r>
               <a:rPr lang="de-DE" dirty="0" err="1" smtClean="0"/>
@@ -2005,8 +2067,9 @@
             </a:r>
             <a:r>
               <a:rPr lang="de-DE" dirty="0" smtClean="0"/>
-              <a:t> zu sein!</a:t>
-            </a:r>
+              <a:t> werden</a:t>
+            </a:r>
+            <a:endParaRPr lang="de-DE" dirty="0" smtClean="0"/>
           </a:p>
           <a:p>
             <a:pPr lvl="1"/>
@@ -2102,6 +2165,143 @@
           <a:prstGeom prst="rect">
             <a:avLst/>
           </a:prstGeom>
+        </p:spPr>
+      </p:pic>
+      <p:sp>
+        <p:nvSpPr>
+          <p:cNvPr id="5" name="Textfeld 4"/>
+          <p:cNvSpPr txBox="1"/>
+          <p:nvPr/>
+        </p:nvSpPr>
+        <p:spPr>
+          <a:xfrm>
+            <a:off x="239285" y="4936890"/>
+            <a:ext cx="1044856" cy="276999"/>
+          </a:xfrm>
+          <a:prstGeom prst="rect">
+            <a:avLst/>
+          </a:prstGeom>
+          <a:noFill/>
+        </p:spPr>
+        <p:txBody>
+          <a:bodyPr wrap="square" rtlCol="0">
+            <a:spAutoFit/>
+          </a:bodyPr>
+          <a:lstStyle/>
+          <a:p>
+            <a:r>
+              <a:rPr lang="de-DE" sz="600" dirty="0">
+                <a:solidFill>
+                  <a:srgbClr val="5D5E5F"/>
+                </a:solidFill>
+                <a:latin typeface="Avenir Light"/>
+                <a:cs typeface="Avenir Light"/>
+              </a:rPr>
+              <a:t>Letzte Änderung: </a:t>
+            </a:r>
+            <a:fld id="{7A8C7DAC-E536-564C-B5B3-90E8FAB50562}" type="datetime1">
+              <a:rPr lang="de-DE" sz="600" smtClean="0">
+                <a:solidFill>
+                  <a:srgbClr val="5D5E5F"/>
+                </a:solidFill>
+                <a:latin typeface="Avenir Light"/>
+                <a:cs typeface="Avenir Light"/>
+              </a:rPr>
+              <a:t>21.12.15</a:t>
+            </a:fld>
+            <a:endParaRPr lang="de-DE" sz="600" dirty="0">
+              <a:solidFill>
+                <a:srgbClr val="5D5E5F"/>
+              </a:solidFill>
+              <a:latin typeface="Avenir Light"/>
+              <a:cs typeface="Avenir Light"/>
+            </a:endParaRPr>
+          </a:p>
+        </p:txBody>
+      </p:sp>
+      <p:sp>
+        <p:nvSpPr>
+          <p:cNvPr id="6" name="Shape 7"/>
+          <p:cNvSpPr/>
+          <p:nvPr/>
+        </p:nvSpPr>
+        <p:spPr>
+          <a:xfrm>
+            <a:off x="1619767" y="4952581"/>
+            <a:ext cx="4164935" cy="276995"/>
+          </a:xfrm>
+          <a:prstGeom prst="rect">
+            <a:avLst/>
+          </a:prstGeom>
+          <a:ln w="12700">
+            <a:miter lim="400000"/>
+          </a:ln>
+          <a:extLst>
+            <a:ext uri="{C572A759-6A51-4108-AA02-DFA0A04FC94B}">
+              <ma14:wrappingTextBoxFlag xmlns:ma14="http://schemas.microsoft.com/office/mac/drawingml/2011/main" val="1"/>
+            </a:ext>
+          </a:extLst>
+        </p:spPr>
+        <p:txBody>
+          <a:bodyPr wrap="none" lIns="45718" tIns="45718" rIns="45718" bIns="45718">
+            <a:spAutoFit/>
+          </a:bodyPr>
+          <a:lstStyle/>
+          <a:p>
+            <a:pPr lvl="0" algn="ctr">
+              <a:defRPr sz="1800"/>
+            </a:pPr>
+            <a:r>
+              <a:rPr sz="600" dirty="0">
+                <a:latin typeface="Avenir Light"/>
+                <a:ea typeface="Calibri"/>
+                <a:cs typeface="Avenir Light"/>
+                <a:sym typeface="Calibri"/>
+              </a:rPr>
+              <a:t>This work is licensed under the Creative Commons Attribution-NonCommercial-NoDerivatives 4.0 International License. </a:t>
+            </a:r>
+          </a:p>
+          <a:p>
+            <a:pPr lvl="0" algn="ctr">
+              <a:defRPr sz="1800"/>
+            </a:pPr>
+            <a:r>
+              <a:rPr sz="600" dirty="0">
+                <a:latin typeface="Avenir Light"/>
+                <a:ea typeface="Calibri"/>
+                <a:cs typeface="Avenir Light"/>
+                <a:sym typeface="Calibri"/>
+              </a:rPr>
+              <a:t>To view a copy of this license, visit http://creativecommons.org/licenses/by-nc-nd/4.0/.</a:t>
+            </a:r>
+          </a:p>
+        </p:txBody>
+      </p:sp>
+      <p:pic>
+        <p:nvPicPr>
+          <p:cNvPr id="7" name="pasted-image.tif"/>
+          <p:cNvPicPr/>
+          <p:nvPr/>
+        </p:nvPicPr>
+        <p:blipFill>
+          <a:blip r:embed="rId3">
+            <a:extLst/>
+          </a:blip>
+          <a:stretch>
+            <a:fillRect/>
+          </a:stretch>
+        </p:blipFill>
+        <p:spPr>
+          <a:xfrm>
+            <a:off x="6216805" y="4992838"/>
+            <a:ext cx="886619" cy="214128"/>
+          </a:xfrm>
+          <a:prstGeom prst="rect">
+            <a:avLst/>
+          </a:prstGeom>
+          <a:ln w="12700">
+            <a:miter lim="400000"/>
+          </a:ln>
         </p:spPr>
       </p:pic>
     </p:spTree>

</xml_diff>